<commit_message>
Aktualizacja danych z zajęć ze środy.
</commit_message>
<xml_diff>
--- a/Dokumentacja/prezentacja_sprawozdanie.pptx
+++ b/Dokumentacja/prezentacja_sprawozdanie.pptx
@@ -5,13 +5,17 @@
     <p:sldMasterId id="2147483672" r:id="rId1"/>
   </p:sldMasterIdLst>
   <p:notesMasterIdLst>
-    <p:notesMasterId r:id="rId6"/>
+    <p:notesMasterId r:id="rId10"/>
   </p:notesMasterIdLst>
   <p:sldIdLst>
     <p:sldId id="256" r:id="rId2"/>
     <p:sldId id="257" r:id="rId3"/>
     <p:sldId id="258" r:id="rId4"/>
     <p:sldId id="259" r:id="rId5"/>
+    <p:sldId id="260" r:id="rId6"/>
+    <p:sldId id="261" r:id="rId7"/>
+    <p:sldId id="262" r:id="rId8"/>
+    <p:sldId id="263" r:id="rId9"/>
   </p:sldIdLst>
   <p:sldSz cx="9144000" cy="6858000" type="screen4x3"/>
   <p:notesSz cx="6858000" cy="9144000"/>
@@ -195,7 +199,7 @@
           <a:p>
             <a:fld id="{276F9C06-F346-48AB-9FE8-2C890CABB23A}" type="datetimeFigureOut">
               <a:rPr lang="pl-PL" smtClean="0"/>
-              <a:t>11.05.2017</a:t>
+              <a:t>17.05.2017</a:t>
             </a:fld>
             <a:endParaRPr lang="pl-PL"/>
           </a:p>
@@ -652,7 +656,7 @@
           <a:p>
             <a:fld id="{C6D6AD2A-B395-4591-8551-E45590CDA7A3}" type="datetime1">
               <a:rPr lang="pl-PL" smtClean="0"/>
-              <a:t>11.05.2017</a:t>
+              <a:t>17.05.2017</a:t>
             </a:fld>
             <a:endParaRPr lang="pl-PL"/>
           </a:p>
@@ -887,7 +891,7 @@
           <a:p>
             <a:fld id="{7033813A-C126-486A-91C4-3E17A8B31910}" type="datetime1">
               <a:rPr lang="pl-PL" smtClean="0"/>
-              <a:t>11.05.2017</a:t>
+              <a:t>17.05.2017</a:t>
             </a:fld>
             <a:endParaRPr lang="pl-PL"/>
           </a:p>
@@ -1082,7 +1086,7 @@
           <a:p>
             <a:fld id="{D6852117-7846-49D2-8028-7D3037F12DB6}" type="datetime1">
               <a:rPr lang="pl-PL" smtClean="0"/>
-              <a:t>11.05.2017</a:t>
+              <a:t>17.05.2017</a:t>
             </a:fld>
             <a:endParaRPr lang="pl-PL"/>
           </a:p>
@@ -1263,7 +1267,7 @@
           <a:p>
             <a:fld id="{DEBB8349-9EFE-4CF4-A443-9D73D6C5CDDC}" type="datetime1">
               <a:rPr lang="pl-PL" smtClean="0"/>
-              <a:t>11.05.2017</a:t>
+              <a:t>17.05.2017</a:t>
             </a:fld>
             <a:endParaRPr lang="pl-PL"/>
           </a:p>
@@ -1518,7 +1522,7 @@
           <a:p>
             <a:fld id="{155A78FA-0EB8-40D3-9CDC-E0736B0C4C35}" type="datetime1">
               <a:rPr lang="pl-PL" smtClean="0"/>
-              <a:t>11.05.2017</a:t>
+              <a:t>17.05.2017</a:t>
             </a:fld>
             <a:endParaRPr lang="pl-PL"/>
           </a:p>
@@ -1863,7 +1867,7 @@
           <a:p>
             <a:fld id="{28B319BA-7EF1-4ED5-AF1A-099C54F8F7B4}" type="datetime1">
               <a:rPr lang="pl-PL" smtClean="0"/>
-              <a:t>11.05.2017</a:t>
+              <a:t>17.05.2017</a:t>
             </a:fld>
             <a:endParaRPr lang="pl-PL"/>
           </a:p>
@@ -2308,7 +2312,7 @@
           <a:p>
             <a:fld id="{0B40057B-584C-474C-A081-F65F5E7966C6}" type="datetime1">
               <a:rPr lang="pl-PL" smtClean="0"/>
-              <a:t>11.05.2017</a:t>
+              <a:t>17.05.2017</a:t>
             </a:fld>
             <a:endParaRPr lang="pl-PL"/>
           </a:p>
@@ -2472,7 +2476,7 @@
           <a:p>
             <a:fld id="{5C25B5B1-0ACD-4764-A2A3-0251308FEF1C}" type="datetime1">
               <a:rPr lang="pl-PL" smtClean="0"/>
-              <a:t>11.05.2017</a:t>
+              <a:t>17.05.2017</a:t>
             </a:fld>
             <a:endParaRPr lang="pl-PL"/>
           </a:p>
@@ -2578,7 +2582,7 @@
           <a:p>
             <a:fld id="{A1E66213-6C40-449F-977E-0A6E121EC626}" type="datetime1">
               <a:rPr lang="pl-PL" smtClean="0"/>
-              <a:t>11.05.2017</a:t>
+              <a:t>17.05.2017</a:t>
             </a:fld>
             <a:endParaRPr lang="pl-PL"/>
           </a:p>
@@ -2874,7 +2878,7 @@
           <a:p>
             <a:fld id="{95E477D7-A444-4B68-96AE-1126F450C109}" type="datetime1">
               <a:rPr lang="pl-PL" smtClean="0"/>
-              <a:t>11.05.2017</a:t>
+              <a:t>17.05.2017</a:t>
             </a:fld>
             <a:endParaRPr lang="pl-PL"/>
           </a:p>
@@ -3150,7 +3154,7 @@
           <a:p>
             <a:fld id="{1330AA89-61BC-4543-9C29-7BF2580DF5BB}" type="datetime1">
               <a:rPr lang="pl-PL" smtClean="0"/>
-              <a:t>11.05.2017</a:t>
+              <a:t>17.05.2017</a:t>
             </a:fld>
             <a:endParaRPr lang="pl-PL"/>
           </a:p>
@@ -3501,7 +3505,7 @@
           <a:p>
             <a:fld id="{284D8F3B-99C0-4D59-90E1-0B93D14B583D}" type="datetime1">
               <a:rPr lang="pl-PL" smtClean="0"/>
-              <a:t>11.05.2017</a:t>
+              <a:t>17.05.2017</a:t>
             </a:fld>
             <a:endParaRPr lang="pl-PL"/>
           </a:p>
@@ -3741,14 +3745,6 @@
               </a:rPr>
               <a:t>GRUPA 1A</a:t>
             </a:r>
-            <a:endParaRPr lang="pl-PL" sz="1200" b="1" kern="1200" spc="-30" baseline="0" dirty="0" smtClean="0">
-              <a:solidFill>
-                <a:schemeClr val="bg1"/>
-              </a:solidFill>
-              <a:latin typeface="Verdana" pitchFamily="34" charset="0"/>
-              <a:ea typeface="Verdana" pitchFamily="34" charset="0"/>
-              <a:cs typeface="Verdana" pitchFamily="34" charset="0"/>
-            </a:endParaRPr>
           </a:p>
         </p:txBody>
       </p:sp>
@@ -4258,7 +4254,7 @@
           <a:p>
             <a:fld id="{90F0A293-143E-49F8-AB74-8BE42FB9E430}" type="datetime1">
               <a:rPr lang="pl-PL" smtClean="0"/>
-              <a:t>11.05.2017</a:t>
+              <a:t>17.05.2017</a:t>
             </a:fld>
             <a:endParaRPr lang="pl-PL"/>
           </a:p>
@@ -4372,77 +4368,6 @@
       </p:sp>
       <p:sp>
         <p:nvSpPr>
-          <p:cNvPr id="3" name="Symbol zastępczy zawartości 2"/>
-          <p:cNvSpPr>
-            <a:spLocks noGrp="1"/>
-          </p:cNvSpPr>
-          <p:nvPr>
-            <p:ph idx="1"/>
-          </p:nvPr>
-        </p:nvSpPr>
-        <p:spPr/>
-        <p:txBody>
-          <a:bodyPr/>
-          <a:lstStyle/>
-          <a:p>
-            <a:r>
-              <a:rPr lang="pl-PL" b="1" i="1" dirty="0" smtClean="0"/>
-              <a:t>2017-05-10 09:30 </a:t>
-            </a:r>
-            <a:r>
-              <a:rPr lang="pl-PL" dirty="0" smtClean="0"/>
-              <a:t>– Czteroosobowa grupa podzieliła się pracą nad projektem „Warcaby”. Został wytypowany pierwszy </a:t>
-            </a:r>
-            <a:r>
-              <a:rPr lang="pl-PL" dirty="0" err="1" smtClean="0"/>
-              <a:t>Scrum</a:t>
-            </a:r>
-            <a:r>
-              <a:rPr lang="pl-PL" dirty="0" smtClean="0"/>
-              <a:t> Master – Maciej.</a:t>
-            </a:r>
-          </a:p>
-          <a:p>
-            <a:r>
-              <a:rPr lang="pl-PL" b="1" i="1" dirty="0" smtClean="0"/>
-              <a:t>2017-05-10 18:00 </a:t>
-            </a:r>
-            <a:r>
-              <a:rPr lang="pl-PL" dirty="0" smtClean="0"/>
-              <a:t>– Zostało utworzone repozytorium projektu w serwisie </a:t>
-            </a:r>
-            <a:r>
-              <a:rPr lang="pl-PL" dirty="0" err="1" smtClean="0"/>
-              <a:t>Github</a:t>
-            </a:r>
-            <a:r>
-              <a:rPr lang="pl-PL" dirty="0" smtClean="0"/>
-              <a:t>. Współpracownicy zostali dodani do projektu.</a:t>
-            </a:r>
-          </a:p>
-          <a:p>
-            <a:r>
-              <a:rPr lang="pl-PL" b="1" i="1" dirty="0" smtClean="0"/>
-              <a:t>2017-05-11 23:00 </a:t>
-            </a:r>
-            <a:r>
-              <a:rPr lang="pl-PL" dirty="0" smtClean="0"/>
-              <a:t>– Przepisano notatki dotyczące projektu tworząc </a:t>
-            </a:r>
-            <a:r>
-              <a:rPr lang="pl-PL" dirty="0" err="1" smtClean="0"/>
-              <a:t>backlog</a:t>
-            </a:r>
-            <a:r>
-              <a:rPr lang="pl-PL" dirty="0" smtClean="0"/>
-              <a:t>. Została założona prezentacja, która docelowo ma być sprawozdaniem z projektu.</a:t>
-            </a:r>
-            <a:endParaRPr lang="pl-PL" dirty="0"/>
-          </a:p>
-        </p:txBody>
-      </p:sp>
-      <p:sp>
-        <p:nvSpPr>
           <p:cNvPr id="4" name="Symbol zastępczy daty 3"/>
           <p:cNvSpPr>
             <a:spLocks noGrp="1"/>
@@ -4458,7 +4383,7 @@
           <a:p>
             <a:fld id="{DEBB8349-9EFE-4CF4-A443-9D73D6C5CDDC}" type="datetime1">
               <a:rPr lang="pl-PL" smtClean="0"/>
-              <a:t>11.05.2017</a:t>
+              <a:t>17.05.2017</a:t>
             </a:fld>
             <a:endParaRPr lang="pl-PL"/>
           </a:p>
@@ -4510,6 +4435,70 @@
           </a:p>
         </p:txBody>
       </p:sp>
+      <p:pic>
+        <p:nvPicPr>
+          <p:cNvPr id="1026" name="Picture 2"/>
+          <p:cNvPicPr>
+            <a:picLocks noChangeAspect="1" noChangeArrowheads="1"/>
+          </p:cNvPicPr>
+          <p:nvPr/>
+        </p:nvPicPr>
+        <p:blipFill>
+          <a:blip r:embed="rId2">
+            <a:extLst>
+              <a:ext uri="{28A0092B-C50C-407E-A947-70E740481C1C}">
+                <a14:useLocalDpi xmlns:a14="http://schemas.microsoft.com/office/drawing/2010/main" val="0"/>
+              </a:ext>
+            </a:extLst>
+          </a:blip>
+          <a:srcRect/>
+          <a:stretch>
+            <a:fillRect/>
+          </a:stretch>
+        </p:blipFill>
+        <p:spPr bwMode="auto">
+          <a:xfrm>
+            <a:off x="614363" y="2233613"/>
+            <a:ext cx="7915275" cy="2390775"/>
+          </a:xfrm>
+          <a:prstGeom prst="rect">
+            <a:avLst/>
+          </a:prstGeom>
+          <a:noFill/>
+          <a:ln>
+            <a:noFill/>
+          </a:ln>
+          <a:effectLst/>
+          <a:extLst>
+            <a:ext uri="{909E8E84-426E-40DD-AFC4-6F175D3DCCD1}">
+              <a14:hiddenFill xmlns:a14="http://schemas.microsoft.com/office/drawing/2010/main">
+                <a:solidFill>
+                  <a:schemeClr val="accent1"/>
+                </a:solidFill>
+              </a14:hiddenFill>
+            </a:ext>
+            <a:ext uri="{91240B29-F687-4F45-9708-019B960494DF}">
+              <a14:hiddenLine xmlns:a14="http://schemas.microsoft.com/office/drawing/2010/main" w="9525">
+                <a:solidFill>
+                  <a:schemeClr val="tx1"/>
+                </a:solidFill>
+                <a:miter lim="800000"/>
+                <a:headEnd/>
+                <a:tailEnd/>
+              </a14:hiddenLine>
+            </a:ext>
+            <a:ext uri="{AF507438-7753-43E0-B8FC-AC1667EBCBE1}">
+              <a14:hiddenEffects xmlns:a14="http://schemas.microsoft.com/office/drawing/2010/main">
+                <a:effectLst>
+                  <a:outerShdw dist="35921" dir="2700000" algn="ctr" rotWithShape="0">
+                    <a:schemeClr val="bg2"/>
+                  </a:outerShdw>
+                </a:effectLst>
+              </a14:hiddenEffects>
+            </a:ext>
+          </a:extLst>
+        </p:spPr>
+      </p:pic>
     </p:spTree>
     <p:extLst>
       <p:ext uri="{BB962C8B-B14F-4D97-AF65-F5344CB8AC3E}">
@@ -4563,8 +4552,8 @@
           <a:lstStyle/>
           <a:p>
             <a:r>
-              <a:rPr lang="pl-PL" dirty="0" err="1" smtClean="0"/>
-              <a:t>Backlog</a:t>
+              <a:rPr lang="pl-PL" dirty="0" smtClean="0"/>
+              <a:t>I Sprint</a:t>
             </a:r>
             <a:endParaRPr lang="pl-PL" dirty="0"/>
           </a:p>
@@ -4572,48 +4561,6 @@
       </p:sp>
       <p:sp>
         <p:nvSpPr>
-          <p:cNvPr id="3" name="Symbol zastępczy zawartości 2"/>
-          <p:cNvSpPr>
-            <a:spLocks noGrp="1"/>
-          </p:cNvSpPr>
-          <p:nvPr>
-            <p:ph idx="1"/>
-          </p:nvPr>
-        </p:nvSpPr>
-        <p:spPr/>
-        <p:txBody>
-          <a:bodyPr/>
-          <a:lstStyle/>
-          <a:p>
-            <a:r>
-              <a:rPr lang="pl-PL" b="1" i="1" dirty="0"/>
-              <a:t>2017-05-11 23:10 </a:t>
-            </a:r>
-            <a:r>
-              <a:rPr lang="pl-PL" dirty="0"/>
-              <a:t>- Została podjęta decyzja o używaniu w całym projekcie formatu </a:t>
-            </a:r>
-            <a:r>
-              <a:rPr lang="pl-PL" dirty="0" err="1"/>
-              <a:t>datu</a:t>
-            </a:r>
-            <a:r>
-              <a:rPr lang="pl-PL" dirty="0"/>
-              <a:t> wg. normy ISO 8601 (RRRR-MM-DD </a:t>
-            </a:r>
-            <a:r>
-              <a:rPr lang="pl-PL" dirty="0" err="1"/>
-              <a:t>gg:mm</a:t>
-            </a:r>
-            <a:r>
-              <a:rPr lang="pl-PL" dirty="0"/>
-              <a:t>).</a:t>
-            </a:r>
-          </a:p>
-        </p:txBody>
-      </p:sp>
-      <p:sp>
-        <p:nvSpPr>
           <p:cNvPr id="4" name="Symbol zastępczy daty 3"/>
           <p:cNvSpPr>
             <a:spLocks noGrp="1"/>
@@ -4629,7 +4576,7 @@
           <a:p>
             <a:fld id="{DEBB8349-9EFE-4CF4-A443-9D73D6C5CDDC}" type="datetime1">
               <a:rPr lang="pl-PL" smtClean="0"/>
-              <a:t>11.05.2017</a:t>
+              <a:t>17.05.2017</a:t>
             </a:fld>
             <a:endParaRPr lang="pl-PL"/>
           </a:p>
@@ -4681,10 +4628,895 @@
           </a:p>
         </p:txBody>
       </p:sp>
+      <p:pic>
+        <p:nvPicPr>
+          <p:cNvPr id="2050" name="Picture 2"/>
+          <p:cNvPicPr>
+            <a:picLocks noChangeAspect="1" noChangeArrowheads="1"/>
+          </p:cNvPicPr>
+          <p:nvPr/>
+        </p:nvPicPr>
+        <p:blipFill>
+          <a:blip r:embed="rId2">
+            <a:extLst>
+              <a:ext uri="{28A0092B-C50C-407E-A947-70E740481C1C}">
+                <a14:useLocalDpi xmlns:a14="http://schemas.microsoft.com/office/drawing/2010/main" val="0"/>
+              </a:ext>
+            </a:extLst>
+          </a:blip>
+          <a:srcRect/>
+          <a:stretch>
+            <a:fillRect/>
+          </a:stretch>
+        </p:blipFill>
+        <p:spPr bwMode="auto">
+          <a:xfrm>
+            <a:off x="652463" y="1340768"/>
+            <a:ext cx="7839075" cy="4991653"/>
+          </a:xfrm>
+          <a:prstGeom prst="rect">
+            <a:avLst/>
+          </a:prstGeom>
+          <a:noFill/>
+          <a:ln>
+            <a:noFill/>
+          </a:ln>
+          <a:effectLst/>
+          <a:extLst>
+            <a:ext uri="{909E8E84-426E-40DD-AFC4-6F175D3DCCD1}">
+              <a14:hiddenFill xmlns:a14="http://schemas.microsoft.com/office/drawing/2010/main">
+                <a:solidFill>
+                  <a:schemeClr val="accent1"/>
+                </a:solidFill>
+              </a14:hiddenFill>
+            </a:ext>
+            <a:ext uri="{91240B29-F687-4F45-9708-019B960494DF}">
+              <a14:hiddenLine xmlns:a14="http://schemas.microsoft.com/office/drawing/2010/main" w="9525">
+                <a:solidFill>
+                  <a:schemeClr val="tx1"/>
+                </a:solidFill>
+                <a:miter lim="800000"/>
+                <a:headEnd/>
+                <a:tailEnd/>
+              </a14:hiddenLine>
+            </a:ext>
+            <a:ext uri="{AF507438-7753-43E0-B8FC-AC1667EBCBE1}">
+              <a14:hiddenEffects xmlns:a14="http://schemas.microsoft.com/office/drawing/2010/main">
+                <a:effectLst>
+                  <a:outerShdw dist="35921" dir="2700000" algn="ctr" rotWithShape="0">
+                    <a:schemeClr val="bg2"/>
+                  </a:outerShdw>
+                </a:effectLst>
+              </a14:hiddenEffects>
+            </a:ext>
+          </a:extLst>
+        </p:spPr>
+      </p:pic>
     </p:spTree>
     <p:extLst>
       <p:ext uri="{BB962C8B-B14F-4D97-AF65-F5344CB8AC3E}">
         <p14:creationId xmlns:p14="http://schemas.microsoft.com/office/powerpoint/2010/main" val="2774064168"/>
+      </p:ext>
+    </p:extLst>
+  </p:cSld>
+  <p:clrMapOvr>
+    <a:masterClrMapping/>
+  </p:clrMapOvr>
+  <p:timing>
+    <p:tnLst>
+      <p:par>
+        <p:cTn id="1" dur="indefinite" restart="never" nodeType="tmRoot"/>
+      </p:par>
+    </p:tnLst>
+  </p:timing>
+</p:sld>
+</file>
+
+<file path=ppt/slides/slide5.xml><?xml version="1.0" encoding="utf-8"?>
+<p:sld xmlns:a="http://schemas.openxmlformats.org/drawingml/2006/main" xmlns:r="http://schemas.openxmlformats.org/officeDocument/2006/relationships" xmlns:p="http://schemas.openxmlformats.org/presentationml/2006/main">
+  <p:cSld>
+    <p:spTree>
+      <p:nvGrpSpPr>
+        <p:cNvPr id="1" name=""/>
+        <p:cNvGrpSpPr/>
+        <p:nvPr/>
+      </p:nvGrpSpPr>
+      <p:grpSpPr>
+        <a:xfrm>
+          <a:off x="0" y="0"/>
+          <a:ext cx="0" cy="0"/>
+          <a:chOff x="0" y="0"/>
+          <a:chExt cx="0" cy="0"/>
+        </a:xfrm>
+      </p:grpSpPr>
+      <p:sp>
+        <p:nvSpPr>
+          <p:cNvPr id="2" name="Tytuł 1"/>
+          <p:cNvSpPr>
+            <a:spLocks noGrp="1"/>
+          </p:cNvSpPr>
+          <p:nvPr>
+            <p:ph type="title"/>
+          </p:nvPr>
+        </p:nvSpPr>
+        <p:spPr/>
+        <p:txBody>
+          <a:bodyPr/>
+          <a:lstStyle/>
+          <a:p>
+            <a:r>
+              <a:rPr lang="pl-PL" dirty="0" smtClean="0"/>
+              <a:t>Raporty</a:t>
+            </a:r>
+            <a:endParaRPr lang="pl-PL" dirty="0"/>
+          </a:p>
+        </p:txBody>
+      </p:sp>
+      <p:sp>
+        <p:nvSpPr>
+          <p:cNvPr id="4" name="Symbol zastępczy daty 3"/>
+          <p:cNvSpPr>
+            <a:spLocks noGrp="1"/>
+          </p:cNvSpPr>
+          <p:nvPr>
+            <p:ph type="dt" sz="half" idx="10"/>
+          </p:nvPr>
+        </p:nvSpPr>
+        <p:spPr/>
+        <p:txBody>
+          <a:bodyPr/>
+          <a:lstStyle/>
+          <a:p>
+            <a:fld id="{DEBB8349-9EFE-4CF4-A443-9D73D6C5CDDC}" type="datetime1">
+              <a:rPr lang="pl-PL" smtClean="0"/>
+              <a:t>17.05.2017</a:t>
+            </a:fld>
+            <a:endParaRPr lang="pl-PL"/>
+          </a:p>
+        </p:txBody>
+      </p:sp>
+      <p:sp>
+        <p:nvSpPr>
+          <p:cNvPr id="5" name="Symbol zastępczy stopki 4"/>
+          <p:cNvSpPr>
+            <a:spLocks noGrp="1"/>
+          </p:cNvSpPr>
+          <p:nvPr>
+            <p:ph type="ftr" sz="quarter" idx="11"/>
+          </p:nvPr>
+        </p:nvSpPr>
+        <p:spPr/>
+        <p:txBody>
+          <a:bodyPr/>
+          <a:lstStyle/>
+          <a:p>
+            <a:r>
+              <a:rPr lang="pl-PL" smtClean="0"/>
+              <a:t>Sprawozdanie z projektu INPG</a:t>
+            </a:r>
+            <a:endParaRPr lang="pl-PL"/>
+          </a:p>
+        </p:txBody>
+      </p:sp>
+      <p:sp>
+        <p:nvSpPr>
+          <p:cNvPr id="6" name="Symbol zastępczy numeru slajdu 5"/>
+          <p:cNvSpPr>
+            <a:spLocks noGrp="1"/>
+          </p:cNvSpPr>
+          <p:nvPr>
+            <p:ph type="sldNum" sz="quarter" idx="12"/>
+          </p:nvPr>
+        </p:nvSpPr>
+        <p:spPr/>
+        <p:txBody>
+          <a:bodyPr/>
+          <a:lstStyle/>
+          <a:p>
+            <a:fld id="{7ABA60A5-3177-43D4-9934-32BA489A924D}" type="slidenum">
+              <a:rPr lang="pl-PL" smtClean="0"/>
+              <a:t>5</a:t>
+            </a:fld>
+            <a:endParaRPr lang="pl-PL"/>
+          </a:p>
+        </p:txBody>
+      </p:sp>
+      <p:pic>
+        <p:nvPicPr>
+          <p:cNvPr id="3074" name="Picture 2"/>
+          <p:cNvPicPr>
+            <a:picLocks noChangeAspect="1" noChangeArrowheads="1"/>
+          </p:cNvPicPr>
+          <p:nvPr/>
+        </p:nvPicPr>
+        <p:blipFill>
+          <a:blip r:embed="rId2">
+            <a:extLst>
+              <a:ext uri="{28A0092B-C50C-407E-A947-70E740481C1C}">
+                <a14:useLocalDpi xmlns:a14="http://schemas.microsoft.com/office/drawing/2010/main" val="0"/>
+              </a:ext>
+            </a:extLst>
+          </a:blip>
+          <a:srcRect/>
+          <a:stretch>
+            <a:fillRect/>
+          </a:stretch>
+        </p:blipFill>
+        <p:spPr bwMode="auto">
+          <a:xfrm>
+            <a:off x="838200" y="1340768"/>
+            <a:ext cx="7467600" cy="4622800"/>
+          </a:xfrm>
+          <a:prstGeom prst="rect">
+            <a:avLst/>
+          </a:prstGeom>
+          <a:noFill/>
+          <a:ln>
+            <a:noFill/>
+          </a:ln>
+          <a:effectLst/>
+          <a:extLst>
+            <a:ext uri="{909E8E84-426E-40DD-AFC4-6F175D3DCCD1}">
+              <a14:hiddenFill xmlns:a14="http://schemas.microsoft.com/office/drawing/2010/main">
+                <a:solidFill>
+                  <a:schemeClr val="accent1"/>
+                </a:solidFill>
+              </a14:hiddenFill>
+            </a:ext>
+            <a:ext uri="{91240B29-F687-4F45-9708-019B960494DF}">
+              <a14:hiddenLine xmlns:a14="http://schemas.microsoft.com/office/drawing/2010/main" w="9525">
+                <a:solidFill>
+                  <a:schemeClr val="tx1"/>
+                </a:solidFill>
+                <a:miter lim="800000"/>
+                <a:headEnd/>
+                <a:tailEnd/>
+              </a14:hiddenLine>
+            </a:ext>
+            <a:ext uri="{AF507438-7753-43E0-B8FC-AC1667EBCBE1}">
+              <a14:hiddenEffects xmlns:a14="http://schemas.microsoft.com/office/drawing/2010/main">
+                <a:effectLst>
+                  <a:outerShdw dist="35921" dir="2700000" algn="ctr" rotWithShape="0">
+                    <a:schemeClr val="bg2"/>
+                  </a:outerShdw>
+                </a:effectLst>
+              </a14:hiddenEffects>
+            </a:ext>
+          </a:extLst>
+        </p:spPr>
+      </p:pic>
+    </p:spTree>
+    <p:extLst>
+      <p:ext uri="{BB962C8B-B14F-4D97-AF65-F5344CB8AC3E}">
+        <p14:creationId xmlns:p14="http://schemas.microsoft.com/office/powerpoint/2010/main" val="1524689310"/>
+      </p:ext>
+    </p:extLst>
+  </p:cSld>
+  <p:clrMapOvr>
+    <a:masterClrMapping/>
+  </p:clrMapOvr>
+  <p:timing>
+    <p:tnLst>
+      <p:par>
+        <p:cTn id="1" dur="indefinite" restart="never" nodeType="tmRoot"/>
+      </p:par>
+    </p:tnLst>
+  </p:timing>
+</p:sld>
+</file>
+
+<file path=ppt/slides/slide6.xml><?xml version="1.0" encoding="utf-8"?>
+<p:sld xmlns:a="http://schemas.openxmlformats.org/drawingml/2006/main" xmlns:r="http://schemas.openxmlformats.org/officeDocument/2006/relationships" xmlns:p="http://schemas.openxmlformats.org/presentationml/2006/main">
+  <p:cSld>
+    <p:spTree>
+      <p:nvGrpSpPr>
+        <p:cNvPr id="1" name=""/>
+        <p:cNvGrpSpPr/>
+        <p:nvPr/>
+      </p:nvGrpSpPr>
+      <p:grpSpPr>
+        <a:xfrm>
+          <a:off x="0" y="0"/>
+          <a:ext cx="0" cy="0"/>
+          <a:chOff x="0" y="0"/>
+          <a:chExt cx="0" cy="0"/>
+        </a:xfrm>
+      </p:grpSpPr>
+      <p:sp>
+        <p:nvSpPr>
+          <p:cNvPr id="2" name="Tytuł 1"/>
+          <p:cNvSpPr>
+            <a:spLocks noGrp="1"/>
+          </p:cNvSpPr>
+          <p:nvPr>
+            <p:ph type="title"/>
+          </p:nvPr>
+        </p:nvSpPr>
+        <p:spPr/>
+        <p:txBody>
+          <a:bodyPr/>
+          <a:lstStyle/>
+          <a:p>
+            <a:r>
+              <a:rPr lang="pl-PL" dirty="0" smtClean="0"/>
+              <a:t>Statystyka </a:t>
+            </a:r>
+            <a:r>
+              <a:rPr lang="pl-PL" dirty="0" err="1" smtClean="0"/>
+              <a:t>commitów</a:t>
+            </a:r>
+            <a:endParaRPr lang="pl-PL" dirty="0"/>
+          </a:p>
+        </p:txBody>
+      </p:sp>
+      <p:sp>
+        <p:nvSpPr>
+          <p:cNvPr id="4" name="Symbol zastępczy daty 3"/>
+          <p:cNvSpPr>
+            <a:spLocks noGrp="1"/>
+          </p:cNvSpPr>
+          <p:nvPr>
+            <p:ph type="dt" sz="half" idx="10"/>
+          </p:nvPr>
+        </p:nvSpPr>
+        <p:spPr/>
+        <p:txBody>
+          <a:bodyPr/>
+          <a:lstStyle/>
+          <a:p>
+            <a:fld id="{DEBB8349-9EFE-4CF4-A443-9D73D6C5CDDC}" type="datetime1">
+              <a:rPr lang="pl-PL" smtClean="0"/>
+              <a:t>17.05.2017</a:t>
+            </a:fld>
+            <a:endParaRPr lang="pl-PL"/>
+          </a:p>
+        </p:txBody>
+      </p:sp>
+      <p:sp>
+        <p:nvSpPr>
+          <p:cNvPr id="5" name="Symbol zastępczy stopki 4"/>
+          <p:cNvSpPr>
+            <a:spLocks noGrp="1"/>
+          </p:cNvSpPr>
+          <p:nvPr>
+            <p:ph type="ftr" sz="quarter" idx="11"/>
+          </p:nvPr>
+        </p:nvSpPr>
+        <p:spPr/>
+        <p:txBody>
+          <a:bodyPr/>
+          <a:lstStyle/>
+          <a:p>
+            <a:r>
+              <a:rPr lang="pl-PL" smtClean="0"/>
+              <a:t>Sprawozdanie z projektu INPG</a:t>
+            </a:r>
+            <a:endParaRPr lang="pl-PL"/>
+          </a:p>
+        </p:txBody>
+      </p:sp>
+      <p:sp>
+        <p:nvSpPr>
+          <p:cNvPr id="6" name="Symbol zastępczy numeru slajdu 5"/>
+          <p:cNvSpPr>
+            <a:spLocks noGrp="1"/>
+          </p:cNvSpPr>
+          <p:nvPr>
+            <p:ph type="sldNum" sz="quarter" idx="12"/>
+          </p:nvPr>
+        </p:nvSpPr>
+        <p:spPr/>
+        <p:txBody>
+          <a:bodyPr/>
+          <a:lstStyle/>
+          <a:p>
+            <a:fld id="{7ABA60A5-3177-43D4-9934-32BA489A924D}" type="slidenum">
+              <a:rPr lang="pl-PL" smtClean="0"/>
+              <a:t>6</a:t>
+            </a:fld>
+            <a:endParaRPr lang="pl-PL"/>
+          </a:p>
+        </p:txBody>
+      </p:sp>
+      <p:pic>
+        <p:nvPicPr>
+          <p:cNvPr id="4098" name="Picture 2"/>
+          <p:cNvPicPr>
+            <a:picLocks noChangeAspect="1" noChangeArrowheads="1"/>
+          </p:cNvPicPr>
+          <p:nvPr/>
+        </p:nvPicPr>
+        <p:blipFill>
+          <a:blip r:embed="rId2">
+            <a:extLst>
+              <a:ext uri="{28A0092B-C50C-407E-A947-70E740481C1C}">
+                <a14:useLocalDpi xmlns:a14="http://schemas.microsoft.com/office/drawing/2010/main" val="0"/>
+              </a:ext>
+            </a:extLst>
+          </a:blip>
+          <a:srcRect/>
+          <a:stretch>
+            <a:fillRect/>
+          </a:stretch>
+        </p:blipFill>
+        <p:spPr bwMode="auto">
+          <a:xfrm>
+            <a:off x="587375" y="1692275"/>
+            <a:ext cx="7969250" cy="3473450"/>
+          </a:xfrm>
+          <a:prstGeom prst="rect">
+            <a:avLst/>
+          </a:prstGeom>
+          <a:noFill/>
+          <a:ln>
+            <a:noFill/>
+          </a:ln>
+          <a:effectLst/>
+          <a:extLst>
+            <a:ext uri="{909E8E84-426E-40DD-AFC4-6F175D3DCCD1}">
+              <a14:hiddenFill xmlns:a14="http://schemas.microsoft.com/office/drawing/2010/main">
+                <a:solidFill>
+                  <a:schemeClr val="accent1"/>
+                </a:solidFill>
+              </a14:hiddenFill>
+            </a:ext>
+            <a:ext uri="{91240B29-F687-4F45-9708-019B960494DF}">
+              <a14:hiddenLine xmlns:a14="http://schemas.microsoft.com/office/drawing/2010/main" w="9525">
+                <a:solidFill>
+                  <a:schemeClr val="tx1"/>
+                </a:solidFill>
+                <a:miter lim="800000"/>
+                <a:headEnd/>
+                <a:tailEnd/>
+              </a14:hiddenLine>
+            </a:ext>
+            <a:ext uri="{AF507438-7753-43E0-B8FC-AC1667EBCBE1}">
+              <a14:hiddenEffects xmlns:a14="http://schemas.microsoft.com/office/drawing/2010/main">
+                <a:effectLst>
+                  <a:outerShdw dist="35921" dir="2700000" algn="ctr" rotWithShape="0">
+                    <a:schemeClr val="bg2"/>
+                  </a:outerShdw>
+                </a:effectLst>
+              </a14:hiddenEffects>
+            </a:ext>
+          </a:extLst>
+        </p:spPr>
+      </p:pic>
+    </p:spTree>
+    <p:extLst>
+      <p:ext uri="{BB962C8B-B14F-4D97-AF65-F5344CB8AC3E}">
+        <p14:creationId xmlns:p14="http://schemas.microsoft.com/office/powerpoint/2010/main" val="1948775304"/>
+      </p:ext>
+    </p:extLst>
+  </p:cSld>
+  <p:clrMapOvr>
+    <a:masterClrMapping/>
+  </p:clrMapOvr>
+  <p:timing>
+    <p:tnLst>
+      <p:par>
+        <p:cTn id="1" dur="indefinite" restart="never" nodeType="tmRoot"/>
+      </p:par>
+    </p:tnLst>
+  </p:timing>
+</p:sld>
+</file>
+
+<file path=ppt/slides/slide7.xml><?xml version="1.0" encoding="utf-8"?>
+<p:sld xmlns:a="http://schemas.openxmlformats.org/drawingml/2006/main" xmlns:r="http://schemas.openxmlformats.org/officeDocument/2006/relationships" xmlns:p="http://schemas.openxmlformats.org/presentationml/2006/main">
+  <p:cSld>
+    <p:spTree>
+      <p:nvGrpSpPr>
+        <p:cNvPr id="1" name=""/>
+        <p:cNvGrpSpPr/>
+        <p:nvPr/>
+      </p:nvGrpSpPr>
+      <p:grpSpPr>
+        <a:xfrm>
+          <a:off x="0" y="0"/>
+          <a:ext cx="0" cy="0"/>
+          <a:chOff x="0" y="0"/>
+          <a:chExt cx="0" cy="0"/>
+        </a:xfrm>
+      </p:grpSpPr>
+      <p:sp>
+        <p:nvSpPr>
+          <p:cNvPr id="2" name="Tytuł 1"/>
+          <p:cNvSpPr>
+            <a:spLocks noGrp="1"/>
+          </p:cNvSpPr>
+          <p:nvPr>
+            <p:ph type="title"/>
+          </p:nvPr>
+        </p:nvSpPr>
+        <p:spPr/>
+        <p:txBody>
+          <a:bodyPr/>
+          <a:lstStyle/>
+          <a:p>
+            <a:r>
+              <a:rPr lang="pl-PL" dirty="0" smtClean="0"/>
+              <a:t>Założenie </a:t>
+            </a:r>
+            <a:r>
+              <a:rPr lang="pl-PL" dirty="0" err="1" smtClean="0"/>
+              <a:t>Trello</a:t>
+            </a:r>
+            <a:endParaRPr lang="pl-PL" dirty="0"/>
+          </a:p>
+        </p:txBody>
+      </p:sp>
+      <p:sp>
+        <p:nvSpPr>
+          <p:cNvPr id="4" name="Symbol zastępczy daty 3"/>
+          <p:cNvSpPr>
+            <a:spLocks noGrp="1"/>
+          </p:cNvSpPr>
+          <p:nvPr>
+            <p:ph type="dt" sz="half" idx="10"/>
+          </p:nvPr>
+        </p:nvSpPr>
+        <p:spPr/>
+        <p:txBody>
+          <a:bodyPr/>
+          <a:lstStyle/>
+          <a:p>
+            <a:fld id="{DEBB8349-9EFE-4CF4-A443-9D73D6C5CDDC}" type="datetime1">
+              <a:rPr lang="pl-PL" smtClean="0"/>
+              <a:t>17.05.2017</a:t>
+            </a:fld>
+            <a:endParaRPr lang="pl-PL"/>
+          </a:p>
+        </p:txBody>
+      </p:sp>
+      <p:sp>
+        <p:nvSpPr>
+          <p:cNvPr id="5" name="Symbol zastępczy stopki 4"/>
+          <p:cNvSpPr>
+            <a:spLocks noGrp="1"/>
+          </p:cNvSpPr>
+          <p:nvPr>
+            <p:ph type="ftr" sz="quarter" idx="11"/>
+          </p:nvPr>
+        </p:nvSpPr>
+        <p:spPr/>
+        <p:txBody>
+          <a:bodyPr/>
+          <a:lstStyle/>
+          <a:p>
+            <a:r>
+              <a:rPr lang="pl-PL" smtClean="0"/>
+              <a:t>Sprawozdanie z projektu INPG</a:t>
+            </a:r>
+            <a:endParaRPr lang="pl-PL"/>
+          </a:p>
+        </p:txBody>
+      </p:sp>
+      <p:sp>
+        <p:nvSpPr>
+          <p:cNvPr id="6" name="Symbol zastępczy numeru slajdu 5"/>
+          <p:cNvSpPr>
+            <a:spLocks noGrp="1"/>
+          </p:cNvSpPr>
+          <p:nvPr>
+            <p:ph type="sldNum" sz="quarter" idx="12"/>
+          </p:nvPr>
+        </p:nvSpPr>
+        <p:spPr/>
+        <p:txBody>
+          <a:bodyPr/>
+          <a:lstStyle/>
+          <a:p>
+            <a:fld id="{7ABA60A5-3177-43D4-9934-32BA489A924D}" type="slidenum">
+              <a:rPr lang="pl-PL" smtClean="0"/>
+              <a:t>7</a:t>
+            </a:fld>
+            <a:endParaRPr lang="pl-PL"/>
+          </a:p>
+        </p:txBody>
+      </p:sp>
+      <p:pic>
+        <p:nvPicPr>
+          <p:cNvPr id="5122" name="Picture 2"/>
+          <p:cNvPicPr>
+            <a:picLocks noChangeAspect="1" noChangeArrowheads="1"/>
+          </p:cNvPicPr>
+          <p:nvPr/>
+        </p:nvPicPr>
+        <p:blipFill>
+          <a:blip r:embed="rId2">
+            <a:extLst>
+              <a:ext uri="{28A0092B-C50C-407E-A947-70E740481C1C}">
+                <a14:useLocalDpi xmlns:a14="http://schemas.microsoft.com/office/drawing/2010/main" val="0"/>
+              </a:ext>
+            </a:extLst>
+          </a:blip>
+          <a:srcRect/>
+          <a:stretch>
+            <a:fillRect/>
+          </a:stretch>
+        </p:blipFill>
+        <p:spPr bwMode="auto">
+          <a:xfrm>
+            <a:off x="251520" y="1628800"/>
+            <a:ext cx="8660292" cy="4032448"/>
+          </a:xfrm>
+          <a:prstGeom prst="rect">
+            <a:avLst/>
+          </a:prstGeom>
+          <a:noFill/>
+          <a:ln>
+            <a:noFill/>
+          </a:ln>
+          <a:effectLst/>
+          <a:extLst>
+            <a:ext uri="{909E8E84-426E-40DD-AFC4-6F175D3DCCD1}">
+              <a14:hiddenFill xmlns:a14="http://schemas.microsoft.com/office/drawing/2010/main">
+                <a:solidFill>
+                  <a:schemeClr val="accent1"/>
+                </a:solidFill>
+              </a14:hiddenFill>
+            </a:ext>
+            <a:ext uri="{91240B29-F687-4F45-9708-019B960494DF}">
+              <a14:hiddenLine xmlns:a14="http://schemas.microsoft.com/office/drawing/2010/main" w="9525">
+                <a:solidFill>
+                  <a:schemeClr val="tx1"/>
+                </a:solidFill>
+                <a:miter lim="800000"/>
+                <a:headEnd/>
+                <a:tailEnd/>
+              </a14:hiddenLine>
+            </a:ext>
+            <a:ext uri="{AF507438-7753-43E0-B8FC-AC1667EBCBE1}">
+              <a14:hiddenEffects xmlns:a14="http://schemas.microsoft.com/office/drawing/2010/main">
+                <a:effectLst>
+                  <a:outerShdw dist="35921" dir="2700000" algn="ctr" rotWithShape="0">
+                    <a:schemeClr val="bg2"/>
+                  </a:outerShdw>
+                </a:effectLst>
+              </a14:hiddenEffects>
+            </a:ext>
+          </a:extLst>
+        </p:spPr>
+      </p:pic>
+    </p:spTree>
+    <p:extLst>
+      <p:ext uri="{BB962C8B-B14F-4D97-AF65-F5344CB8AC3E}">
+        <p14:creationId xmlns:p14="http://schemas.microsoft.com/office/powerpoint/2010/main" val="2501508212"/>
+      </p:ext>
+    </p:extLst>
+  </p:cSld>
+  <p:clrMapOvr>
+    <a:masterClrMapping/>
+  </p:clrMapOvr>
+  <p:timing>
+    <p:tnLst>
+      <p:par>
+        <p:cTn id="1" dur="indefinite" restart="never" nodeType="tmRoot"/>
+      </p:par>
+    </p:tnLst>
+  </p:timing>
+</p:sld>
+</file>
+
+<file path=ppt/slides/slide8.xml><?xml version="1.0" encoding="utf-8"?>
+<p:sld xmlns:a="http://schemas.openxmlformats.org/drawingml/2006/main" xmlns:r="http://schemas.openxmlformats.org/officeDocument/2006/relationships" xmlns:p="http://schemas.openxmlformats.org/presentationml/2006/main">
+  <p:cSld>
+    <p:spTree>
+      <p:nvGrpSpPr>
+        <p:cNvPr id="1" name=""/>
+        <p:cNvGrpSpPr/>
+        <p:nvPr/>
+      </p:nvGrpSpPr>
+      <p:grpSpPr>
+        <a:xfrm>
+          <a:off x="0" y="0"/>
+          <a:ext cx="0" cy="0"/>
+          <a:chOff x="0" y="0"/>
+          <a:chExt cx="0" cy="0"/>
+        </a:xfrm>
+      </p:grpSpPr>
+      <p:sp>
+        <p:nvSpPr>
+          <p:cNvPr id="2" name="Tytuł 1"/>
+          <p:cNvSpPr>
+            <a:spLocks noGrp="1"/>
+          </p:cNvSpPr>
+          <p:nvPr>
+            <p:ph type="title"/>
+          </p:nvPr>
+        </p:nvSpPr>
+        <p:spPr/>
+        <p:txBody>
+          <a:bodyPr/>
+          <a:lstStyle/>
+          <a:p>
+            <a:r>
+              <a:rPr lang="pl-PL" dirty="0" smtClean="0"/>
+              <a:t>Instalacja oprogramowania</a:t>
+            </a:r>
+            <a:endParaRPr lang="pl-PL" dirty="0"/>
+          </a:p>
+        </p:txBody>
+      </p:sp>
+      <p:sp>
+        <p:nvSpPr>
+          <p:cNvPr id="4" name="Symbol zastępczy daty 3"/>
+          <p:cNvSpPr>
+            <a:spLocks noGrp="1"/>
+          </p:cNvSpPr>
+          <p:nvPr>
+            <p:ph type="dt" sz="half" idx="10"/>
+          </p:nvPr>
+        </p:nvSpPr>
+        <p:spPr/>
+        <p:txBody>
+          <a:bodyPr/>
+          <a:lstStyle/>
+          <a:p>
+            <a:fld id="{DEBB8349-9EFE-4CF4-A443-9D73D6C5CDDC}" type="datetime1">
+              <a:rPr lang="pl-PL" smtClean="0"/>
+              <a:t>17.05.2017</a:t>
+            </a:fld>
+            <a:endParaRPr lang="pl-PL"/>
+          </a:p>
+        </p:txBody>
+      </p:sp>
+      <p:sp>
+        <p:nvSpPr>
+          <p:cNvPr id="5" name="Symbol zastępczy stopki 4"/>
+          <p:cNvSpPr>
+            <a:spLocks noGrp="1"/>
+          </p:cNvSpPr>
+          <p:nvPr>
+            <p:ph type="ftr" sz="quarter" idx="11"/>
+          </p:nvPr>
+        </p:nvSpPr>
+        <p:spPr/>
+        <p:txBody>
+          <a:bodyPr/>
+          <a:lstStyle/>
+          <a:p>
+            <a:r>
+              <a:rPr lang="pl-PL" smtClean="0"/>
+              <a:t>Sprawozdanie z projektu INPG</a:t>
+            </a:r>
+            <a:endParaRPr lang="pl-PL"/>
+          </a:p>
+        </p:txBody>
+      </p:sp>
+      <p:sp>
+        <p:nvSpPr>
+          <p:cNvPr id="6" name="Symbol zastępczy numeru slajdu 5"/>
+          <p:cNvSpPr>
+            <a:spLocks noGrp="1"/>
+          </p:cNvSpPr>
+          <p:nvPr>
+            <p:ph type="sldNum" sz="quarter" idx="12"/>
+          </p:nvPr>
+        </p:nvSpPr>
+        <p:spPr/>
+        <p:txBody>
+          <a:bodyPr/>
+          <a:lstStyle/>
+          <a:p>
+            <a:fld id="{7ABA60A5-3177-43D4-9934-32BA489A924D}" type="slidenum">
+              <a:rPr lang="pl-PL" smtClean="0"/>
+              <a:t>8</a:t>
+            </a:fld>
+            <a:endParaRPr lang="pl-PL"/>
+          </a:p>
+        </p:txBody>
+      </p:sp>
+      <p:pic>
+        <p:nvPicPr>
+          <p:cNvPr id="6146" name="Picture 2"/>
+          <p:cNvPicPr>
+            <a:picLocks noChangeAspect="1" noChangeArrowheads="1"/>
+          </p:cNvPicPr>
+          <p:nvPr/>
+        </p:nvPicPr>
+        <p:blipFill>
+          <a:blip r:embed="rId2">
+            <a:extLst>
+              <a:ext uri="{28A0092B-C50C-407E-A947-70E740481C1C}">
+                <a14:useLocalDpi xmlns:a14="http://schemas.microsoft.com/office/drawing/2010/main" val="0"/>
+              </a:ext>
+            </a:extLst>
+          </a:blip>
+          <a:srcRect/>
+          <a:stretch>
+            <a:fillRect/>
+          </a:stretch>
+        </p:blipFill>
+        <p:spPr bwMode="auto">
+          <a:xfrm>
+            <a:off x="395536" y="1772816"/>
+            <a:ext cx="6301903" cy="2114409"/>
+          </a:xfrm>
+          <a:prstGeom prst="rect">
+            <a:avLst/>
+          </a:prstGeom>
+          <a:noFill/>
+          <a:ln>
+            <a:noFill/>
+          </a:ln>
+          <a:effectLst/>
+          <a:extLst>
+            <a:ext uri="{909E8E84-426E-40DD-AFC4-6F175D3DCCD1}">
+              <a14:hiddenFill xmlns:a14="http://schemas.microsoft.com/office/drawing/2010/main">
+                <a:solidFill>
+                  <a:schemeClr val="accent1"/>
+                </a:solidFill>
+              </a14:hiddenFill>
+            </a:ext>
+            <a:ext uri="{91240B29-F687-4F45-9708-019B960494DF}">
+              <a14:hiddenLine xmlns:a14="http://schemas.microsoft.com/office/drawing/2010/main" w="9525">
+                <a:solidFill>
+                  <a:schemeClr val="tx1"/>
+                </a:solidFill>
+                <a:miter lim="800000"/>
+                <a:headEnd/>
+                <a:tailEnd/>
+              </a14:hiddenLine>
+            </a:ext>
+            <a:ext uri="{AF507438-7753-43E0-B8FC-AC1667EBCBE1}">
+              <a14:hiddenEffects xmlns:a14="http://schemas.microsoft.com/office/drawing/2010/main">
+                <a:effectLst>
+                  <a:outerShdw dist="35921" dir="2700000" algn="ctr" rotWithShape="0">
+                    <a:schemeClr val="bg2"/>
+                  </a:outerShdw>
+                </a:effectLst>
+              </a14:hiddenEffects>
+            </a:ext>
+          </a:extLst>
+        </p:spPr>
+      </p:pic>
+      <p:pic>
+        <p:nvPicPr>
+          <p:cNvPr id="6148" name="Picture 4" descr="https://scontent-waw1-1.xx.fbcdn.net/v/t35.0-12/18553130_1550892381618967_1180952906_o.png?oh=0a37913b104f46c98619132700ff028c&amp;oe=591ED8D2"/>
+          <p:cNvPicPr>
+            <a:picLocks noChangeAspect="1" noChangeArrowheads="1"/>
+          </p:cNvPicPr>
+          <p:nvPr/>
+        </p:nvPicPr>
+        <p:blipFill>
+          <a:blip r:embed="rId3" cstate="print">
+            <a:extLst>
+              <a:ext uri="{28A0092B-C50C-407E-A947-70E740481C1C}">
+                <a14:useLocalDpi xmlns:a14="http://schemas.microsoft.com/office/drawing/2010/main" val="0"/>
+              </a:ext>
+            </a:extLst>
+          </a:blip>
+          <a:srcRect/>
+          <a:stretch>
+            <a:fillRect/>
+          </a:stretch>
+        </p:blipFill>
+        <p:spPr bwMode="auto">
+          <a:xfrm>
+            <a:off x="3275856" y="2830020"/>
+            <a:ext cx="5472608" cy="3078342"/>
+          </a:xfrm>
+          <a:prstGeom prst="rect">
+            <a:avLst/>
+          </a:prstGeom>
+          <a:noFill/>
+          <a:extLst>
+            <a:ext uri="{909E8E84-426E-40DD-AFC4-6F175D3DCCD1}">
+              <a14:hiddenFill xmlns:a14="http://schemas.microsoft.com/office/drawing/2010/main">
+                <a:solidFill>
+                  <a:srgbClr val="FFFFFF"/>
+                </a:solidFill>
+              </a14:hiddenFill>
+            </a:ext>
+          </a:extLst>
+        </p:spPr>
+      </p:pic>
+    </p:spTree>
+    <p:extLst>
+      <p:ext uri="{BB962C8B-B14F-4D97-AF65-F5344CB8AC3E}">
+        <p14:creationId xmlns:p14="http://schemas.microsoft.com/office/powerpoint/2010/main" val="2505419348"/>
       </p:ext>
     </p:extLst>
   </p:cSld>

</xml_diff>

<commit_message>
Aktualizacja backlog.docx oraz SPRAWOZDANIE Z PROJEKTU.docx
</commit_message>
<xml_diff>
--- a/Dokumentacja/prezentacja_sprawozdanie.pptx
+++ b/Dokumentacja/prezentacja_sprawozdanie.pptx
@@ -199,7 +199,8 @@
           <a:p>
             <a:fld id="{276F9C06-F346-48AB-9FE8-2C890CABB23A}" type="datetimeFigureOut">
               <a:rPr lang="pl-PL" smtClean="0"/>
-              <a:t>17.05.2017</a:t>
+              <a:pPr/>
+              <a:t>20.05.2017</a:t>
             </a:fld>
             <a:endParaRPr lang="pl-PL"/>
           </a:p>
@@ -358,6 +359,7 @@
           <a:p>
             <a:fld id="{12A8EBB4-7654-47EC-A140-053323224BFC}" type="slidenum">
               <a:rPr lang="pl-PL" smtClean="0"/>
+              <a:pPr/>
               <a:t>‹#›</a:t>
             </a:fld>
             <a:endParaRPr lang="pl-PL"/>
@@ -367,7 +369,7 @@
     </p:spTree>
     <p:extLst>
       <p:ext uri="{BB962C8B-B14F-4D97-AF65-F5344CB8AC3E}">
-        <p14:creationId xmlns:p14="http://schemas.microsoft.com/office/powerpoint/2010/main" val="300443393"/>
+        <p14:creationId xmlns:p14="http://schemas.microsoft.com/office/powerpoint/2010/main" xmlns="" val="300443393"/>
       </p:ext>
     </p:extLst>
   </p:cSld>
@@ -467,6 +469,88 @@
 </p:notesMaster>
 </file>
 
+<file path=ppt/notesSlides/notesSlide1.xml><?xml version="1.0" encoding="utf-8"?>
+<p:notes xmlns:a="http://schemas.openxmlformats.org/drawingml/2006/main" xmlns:r="http://schemas.openxmlformats.org/officeDocument/2006/relationships" xmlns:p="http://schemas.openxmlformats.org/presentationml/2006/main">
+  <p:cSld>
+    <p:spTree>
+      <p:nvGrpSpPr>
+        <p:cNvPr id="1" name=""/>
+        <p:cNvGrpSpPr/>
+        <p:nvPr/>
+      </p:nvGrpSpPr>
+      <p:grpSpPr>
+        <a:xfrm>
+          <a:off x="0" y="0"/>
+          <a:ext cx="0" cy="0"/>
+          <a:chOff x="0" y="0"/>
+          <a:chExt cx="0" cy="0"/>
+        </a:xfrm>
+      </p:grpSpPr>
+      <p:sp>
+        <p:nvSpPr>
+          <p:cNvPr id="2" name="Symbol zastępczy obrazu slajdu 1"/>
+          <p:cNvSpPr>
+            <a:spLocks noGrp="1" noRot="1" noChangeAspect="1"/>
+          </p:cNvSpPr>
+          <p:nvPr>
+            <p:ph type="sldImg"/>
+          </p:nvPr>
+        </p:nvSpPr>
+        <p:spPr/>
+      </p:sp>
+      <p:sp>
+        <p:nvSpPr>
+          <p:cNvPr id="3" name="Symbol zastępczy notatek 2"/>
+          <p:cNvSpPr>
+            <a:spLocks noGrp="1"/>
+          </p:cNvSpPr>
+          <p:nvPr>
+            <p:ph type="body" idx="1"/>
+          </p:nvPr>
+        </p:nvSpPr>
+        <p:spPr/>
+        <p:txBody>
+          <a:bodyPr>
+            <a:normAutofit/>
+          </a:bodyPr>
+          <a:lstStyle/>
+          <a:p>
+            <a:endParaRPr lang="pl-PL"/>
+          </a:p>
+        </p:txBody>
+      </p:sp>
+      <p:sp>
+        <p:nvSpPr>
+          <p:cNvPr id="4" name="Symbol zastępczy numeru slajdu 3"/>
+          <p:cNvSpPr>
+            <a:spLocks noGrp="1"/>
+          </p:cNvSpPr>
+          <p:nvPr>
+            <p:ph type="sldNum" sz="quarter" idx="10"/>
+          </p:nvPr>
+        </p:nvSpPr>
+        <p:spPr/>
+        <p:txBody>
+          <a:bodyPr/>
+          <a:lstStyle/>
+          <a:p>
+            <a:fld id="{12A8EBB4-7654-47EC-A140-053323224BFC}" type="slidenum">
+              <a:rPr lang="pl-PL" smtClean="0"/>
+              <a:pPr/>
+              <a:t>1</a:t>
+            </a:fld>
+            <a:endParaRPr lang="pl-PL"/>
+          </a:p>
+        </p:txBody>
+      </p:sp>
+    </p:spTree>
+  </p:cSld>
+  <p:clrMapOvr>
+    <a:masterClrMapping/>
+  </p:clrMapOvr>
+</p:notes>
+</file>
+
 <file path=ppt/slideLayouts/slideLayout1.xml><?xml version="1.0" encoding="utf-8"?>
 <p:sldLayout xmlns:a="http://schemas.openxmlformats.org/drawingml/2006/main" xmlns:r="http://schemas.openxmlformats.org/officeDocument/2006/relationships" xmlns:p="http://schemas.openxmlformats.org/presentationml/2006/main" type="title" preserve="1">
   <p:cSld name="Slajd tytułowy">
@@ -656,7 +740,8 @@
           <a:p>
             <a:fld id="{C6D6AD2A-B395-4591-8551-E45590CDA7A3}" type="datetime1">
               <a:rPr lang="pl-PL" smtClean="0"/>
-              <a:t>17.05.2017</a:t>
+              <a:pPr/>
+              <a:t>20.05.2017</a:t>
             </a:fld>
             <a:endParaRPr lang="pl-PL"/>
           </a:p>
@@ -706,6 +791,7 @@
           <a:p>
             <a:fld id="{7ABA60A5-3177-43D4-9934-32BA489A924D}" type="slidenum">
               <a:rPr lang="pl-PL" smtClean="0"/>
+              <a:pPr/>
               <a:t>‹#›</a:t>
             </a:fld>
             <a:endParaRPr lang="pl-PL"/>
@@ -761,7 +847,7 @@
     </p:spTree>
     <p:extLst>
       <p:ext uri="{BB962C8B-B14F-4D97-AF65-F5344CB8AC3E}">
-        <p14:creationId xmlns:p14="http://schemas.microsoft.com/office/powerpoint/2010/main" val="3756253045"/>
+        <p14:creationId xmlns:p14="http://schemas.microsoft.com/office/powerpoint/2010/main" xmlns="" val="3756253045"/>
       </p:ext>
     </p:extLst>
   </p:cSld>
@@ -891,7 +977,8 @@
           <a:p>
             <a:fld id="{7033813A-C126-486A-91C4-3E17A8B31910}" type="datetime1">
               <a:rPr lang="pl-PL" smtClean="0"/>
-              <a:t>17.05.2017</a:t>
+              <a:pPr/>
+              <a:t>20.05.2017</a:t>
             </a:fld>
             <a:endParaRPr lang="pl-PL"/>
           </a:p>
@@ -937,6 +1024,7 @@
           <a:p>
             <a:fld id="{7ABA60A5-3177-43D4-9934-32BA489A924D}" type="slidenum">
               <a:rPr lang="pl-PL" smtClean="0"/>
+              <a:pPr/>
               <a:t>‹#›</a:t>
             </a:fld>
             <a:endParaRPr lang="pl-PL"/>
@@ -946,7 +1034,7 @@
     </p:spTree>
     <p:extLst>
       <p:ext uri="{BB962C8B-B14F-4D97-AF65-F5344CB8AC3E}">
-        <p14:creationId xmlns:p14="http://schemas.microsoft.com/office/powerpoint/2010/main" val="1309881333"/>
+        <p14:creationId xmlns:p14="http://schemas.microsoft.com/office/powerpoint/2010/main" xmlns="" val="1309881333"/>
       </p:ext>
     </p:extLst>
   </p:cSld>
@@ -1086,7 +1174,8 @@
           <a:p>
             <a:fld id="{D6852117-7846-49D2-8028-7D3037F12DB6}" type="datetime1">
               <a:rPr lang="pl-PL" smtClean="0"/>
-              <a:t>17.05.2017</a:t>
+              <a:pPr/>
+              <a:t>20.05.2017</a:t>
             </a:fld>
             <a:endParaRPr lang="pl-PL"/>
           </a:p>
@@ -1132,6 +1221,7 @@
           <a:p>
             <a:fld id="{7ABA60A5-3177-43D4-9934-32BA489A924D}" type="slidenum">
               <a:rPr lang="pl-PL" smtClean="0"/>
+              <a:pPr/>
               <a:t>‹#›</a:t>
             </a:fld>
             <a:endParaRPr lang="pl-PL"/>
@@ -1141,7 +1231,7 @@
     </p:spTree>
     <p:extLst>
       <p:ext uri="{BB962C8B-B14F-4D97-AF65-F5344CB8AC3E}">
-        <p14:creationId xmlns:p14="http://schemas.microsoft.com/office/powerpoint/2010/main" val="329151347"/>
+        <p14:creationId xmlns:p14="http://schemas.microsoft.com/office/powerpoint/2010/main" xmlns="" val="329151347"/>
       </p:ext>
     </p:extLst>
   </p:cSld>
@@ -1267,7 +1357,8 @@
           <a:p>
             <a:fld id="{DEBB8349-9EFE-4CF4-A443-9D73D6C5CDDC}" type="datetime1">
               <a:rPr lang="pl-PL" smtClean="0"/>
-              <a:t>17.05.2017</a:t>
+              <a:pPr/>
+              <a:t>20.05.2017</a:t>
             </a:fld>
             <a:endParaRPr lang="pl-PL"/>
           </a:p>
@@ -1313,6 +1404,7 @@
           <a:p>
             <a:fld id="{7ABA60A5-3177-43D4-9934-32BA489A924D}" type="slidenum">
               <a:rPr lang="pl-PL" smtClean="0"/>
+              <a:pPr/>
               <a:t>‹#›</a:t>
             </a:fld>
             <a:endParaRPr lang="pl-PL"/>
@@ -1322,7 +1414,7 @@
     </p:spTree>
     <p:extLst>
       <p:ext uri="{BB962C8B-B14F-4D97-AF65-F5344CB8AC3E}">
-        <p14:creationId xmlns:p14="http://schemas.microsoft.com/office/powerpoint/2010/main" val="1011440719"/>
+        <p14:creationId xmlns:p14="http://schemas.microsoft.com/office/powerpoint/2010/main" xmlns="" val="1011440719"/>
       </p:ext>
     </p:extLst>
   </p:cSld>
@@ -1522,7 +1614,8 @@
           <a:p>
             <a:fld id="{155A78FA-0EB8-40D3-9CDC-E0736B0C4C35}" type="datetime1">
               <a:rPr lang="pl-PL" smtClean="0"/>
-              <a:t>17.05.2017</a:t>
+              <a:pPr/>
+              <a:t>20.05.2017</a:t>
             </a:fld>
             <a:endParaRPr lang="pl-PL"/>
           </a:p>
@@ -1568,6 +1661,7 @@
           <a:p>
             <a:fld id="{7ABA60A5-3177-43D4-9934-32BA489A924D}" type="slidenum">
               <a:rPr lang="pl-PL" smtClean="0"/>
+              <a:pPr/>
               <a:t>‹#›</a:t>
             </a:fld>
             <a:endParaRPr lang="pl-PL"/>
@@ -1623,7 +1717,7 @@
     </p:spTree>
     <p:extLst>
       <p:ext uri="{BB962C8B-B14F-4D97-AF65-F5344CB8AC3E}">
-        <p14:creationId xmlns:p14="http://schemas.microsoft.com/office/powerpoint/2010/main" val="3200326934"/>
+        <p14:creationId xmlns:p14="http://schemas.microsoft.com/office/powerpoint/2010/main" xmlns="" val="3200326934"/>
       </p:ext>
     </p:extLst>
   </p:cSld>
@@ -1867,7 +1961,8 @@
           <a:p>
             <a:fld id="{28B319BA-7EF1-4ED5-AF1A-099C54F8F7B4}" type="datetime1">
               <a:rPr lang="pl-PL" smtClean="0"/>
-              <a:t>17.05.2017</a:t>
+              <a:pPr/>
+              <a:t>20.05.2017</a:t>
             </a:fld>
             <a:endParaRPr lang="pl-PL"/>
           </a:p>
@@ -1913,6 +2008,7 @@
           <a:p>
             <a:fld id="{7ABA60A5-3177-43D4-9934-32BA489A924D}" type="slidenum">
               <a:rPr lang="pl-PL" smtClean="0"/>
+              <a:pPr/>
               <a:t>‹#›</a:t>
             </a:fld>
             <a:endParaRPr lang="pl-PL"/>
@@ -1922,7 +2018,7 @@
     </p:spTree>
     <p:extLst>
       <p:ext uri="{BB962C8B-B14F-4D97-AF65-F5344CB8AC3E}">
-        <p14:creationId xmlns:p14="http://schemas.microsoft.com/office/powerpoint/2010/main" val="270095441"/>
+        <p14:creationId xmlns:p14="http://schemas.microsoft.com/office/powerpoint/2010/main" xmlns="" val="270095441"/>
       </p:ext>
     </p:extLst>
   </p:cSld>
@@ -2312,7 +2408,8 @@
           <a:p>
             <a:fld id="{0B40057B-584C-474C-A081-F65F5E7966C6}" type="datetime1">
               <a:rPr lang="pl-PL" smtClean="0"/>
-              <a:t>17.05.2017</a:t>
+              <a:pPr/>
+              <a:t>20.05.2017</a:t>
             </a:fld>
             <a:endParaRPr lang="pl-PL"/>
           </a:p>
@@ -2358,6 +2455,7 @@
           <a:p>
             <a:fld id="{7ABA60A5-3177-43D4-9934-32BA489A924D}" type="slidenum">
               <a:rPr lang="pl-PL" smtClean="0"/>
+              <a:pPr/>
               <a:t>‹#›</a:t>
             </a:fld>
             <a:endParaRPr lang="pl-PL"/>
@@ -2402,7 +2500,7 @@
     </p:spTree>
     <p:extLst>
       <p:ext uri="{BB962C8B-B14F-4D97-AF65-F5344CB8AC3E}">
-        <p14:creationId xmlns:p14="http://schemas.microsoft.com/office/powerpoint/2010/main" val="3242026738"/>
+        <p14:creationId xmlns:p14="http://schemas.microsoft.com/office/powerpoint/2010/main" xmlns="" val="3242026738"/>
       </p:ext>
     </p:extLst>
   </p:cSld>
@@ -2476,7 +2574,8 @@
           <a:p>
             <a:fld id="{5C25B5B1-0ACD-4764-A2A3-0251308FEF1C}" type="datetime1">
               <a:rPr lang="pl-PL" smtClean="0"/>
-              <a:t>17.05.2017</a:t>
+              <a:pPr/>
+              <a:t>20.05.2017</a:t>
             </a:fld>
             <a:endParaRPr lang="pl-PL"/>
           </a:p>
@@ -2522,6 +2621,7 @@
           <a:p>
             <a:fld id="{7ABA60A5-3177-43D4-9934-32BA489A924D}" type="slidenum">
               <a:rPr lang="pl-PL" smtClean="0"/>
+              <a:pPr/>
               <a:t>‹#›</a:t>
             </a:fld>
             <a:endParaRPr lang="pl-PL"/>
@@ -2531,7 +2631,7 @@
     </p:spTree>
     <p:extLst>
       <p:ext uri="{BB962C8B-B14F-4D97-AF65-F5344CB8AC3E}">
-        <p14:creationId xmlns:p14="http://schemas.microsoft.com/office/powerpoint/2010/main" val="2047916407"/>
+        <p14:creationId xmlns:p14="http://schemas.microsoft.com/office/powerpoint/2010/main" xmlns="" val="2047916407"/>
       </p:ext>
     </p:extLst>
   </p:cSld>
@@ -2582,7 +2682,8 @@
           <a:p>
             <a:fld id="{A1E66213-6C40-449F-977E-0A6E121EC626}" type="datetime1">
               <a:rPr lang="pl-PL" smtClean="0"/>
-              <a:t>17.05.2017</a:t>
+              <a:pPr/>
+              <a:t>20.05.2017</a:t>
             </a:fld>
             <a:endParaRPr lang="pl-PL"/>
           </a:p>
@@ -2628,6 +2729,7 @@
           <a:p>
             <a:fld id="{7ABA60A5-3177-43D4-9934-32BA489A924D}" type="slidenum">
               <a:rPr lang="pl-PL" smtClean="0"/>
+              <a:pPr/>
               <a:t>‹#›</a:t>
             </a:fld>
             <a:endParaRPr lang="pl-PL"/>
@@ -2637,7 +2739,7 @@
     </p:spTree>
     <p:extLst>
       <p:ext uri="{BB962C8B-B14F-4D97-AF65-F5344CB8AC3E}">
-        <p14:creationId xmlns:p14="http://schemas.microsoft.com/office/powerpoint/2010/main" val="672770679"/>
+        <p14:creationId xmlns:p14="http://schemas.microsoft.com/office/powerpoint/2010/main" xmlns="" val="672770679"/>
       </p:ext>
     </p:extLst>
   </p:cSld>
@@ -2878,7 +2980,8 @@
           <a:p>
             <a:fld id="{95E477D7-A444-4B68-96AE-1126F450C109}" type="datetime1">
               <a:rPr lang="pl-PL" smtClean="0"/>
-              <a:t>17.05.2017</a:t>
+              <a:pPr/>
+              <a:t>20.05.2017</a:t>
             </a:fld>
             <a:endParaRPr lang="pl-PL"/>
           </a:p>
@@ -2924,6 +3027,7 @@
           <a:p>
             <a:fld id="{7ABA60A5-3177-43D4-9934-32BA489A924D}" type="slidenum">
               <a:rPr lang="pl-PL" smtClean="0"/>
+              <a:pPr/>
               <a:t>‹#›</a:t>
             </a:fld>
             <a:endParaRPr lang="pl-PL"/>
@@ -2933,7 +3037,7 @@
     </p:spTree>
     <p:extLst>
       <p:ext uri="{BB962C8B-B14F-4D97-AF65-F5344CB8AC3E}">
-        <p14:creationId xmlns:p14="http://schemas.microsoft.com/office/powerpoint/2010/main" val="1397882822"/>
+        <p14:creationId xmlns:p14="http://schemas.microsoft.com/office/powerpoint/2010/main" xmlns="" val="1397882822"/>
       </p:ext>
     </p:extLst>
   </p:cSld>
@@ -3154,7 +3258,8 @@
           <a:p>
             <a:fld id="{1330AA89-61BC-4543-9C29-7BF2580DF5BB}" type="datetime1">
               <a:rPr lang="pl-PL" smtClean="0"/>
-              <a:t>17.05.2017</a:t>
+              <a:pPr/>
+              <a:t>20.05.2017</a:t>
             </a:fld>
             <a:endParaRPr lang="pl-PL"/>
           </a:p>
@@ -3200,6 +3305,7 @@
           <a:p>
             <a:fld id="{7ABA60A5-3177-43D4-9934-32BA489A924D}" type="slidenum">
               <a:rPr lang="pl-PL" smtClean="0"/>
+              <a:pPr/>
               <a:t>‹#›</a:t>
             </a:fld>
             <a:endParaRPr lang="pl-PL"/>
@@ -3209,7 +3315,7 @@
     </p:spTree>
     <p:extLst>
       <p:ext uri="{BB962C8B-B14F-4D97-AF65-F5344CB8AC3E}">
-        <p14:creationId xmlns:p14="http://schemas.microsoft.com/office/powerpoint/2010/main" val="1944213113"/>
+        <p14:creationId xmlns:p14="http://schemas.microsoft.com/office/powerpoint/2010/main" xmlns="" val="1944213113"/>
       </p:ext>
     </p:extLst>
   </p:cSld>
@@ -3505,7 +3611,8 @@
           <a:p>
             <a:fld id="{284D8F3B-99C0-4D59-90E1-0B93D14B583D}" type="datetime1">
               <a:rPr lang="pl-PL" smtClean="0"/>
-              <a:t>17.05.2017</a:t>
+              <a:pPr/>
+              <a:t>20.05.2017</a:t>
             </a:fld>
             <a:endParaRPr lang="pl-PL"/>
           </a:p>
@@ -3589,6 +3696,7 @@
           <a:p>
             <a:fld id="{7ABA60A5-3177-43D4-9934-32BA489A924D}" type="slidenum">
               <a:rPr lang="pl-PL" smtClean="0"/>
+              <a:pPr/>
               <a:t>‹#›</a:t>
             </a:fld>
             <a:endParaRPr lang="pl-PL"/>
@@ -3607,7 +3715,7 @@
           <a:blip r:embed="rId13" cstate="print">
             <a:extLst>
               <a:ext uri="{28A0092B-C50C-407E-A947-70E740481C1C}">
-                <a14:useLocalDpi xmlns:a14="http://schemas.microsoft.com/office/drawing/2010/main" val="0"/>
+                <a14:useLocalDpi xmlns:a14="http://schemas.microsoft.com/office/drawing/2010/main" xmlns="" val="0"/>
               </a:ext>
             </a:extLst>
           </a:blip>
@@ -3637,7 +3745,7 @@
           <a:blip r:embed="rId14" cstate="print">
             <a:extLst>
               <a:ext uri="{28A0092B-C50C-407E-A947-70E740481C1C}">
-                <a14:useLocalDpi xmlns:a14="http://schemas.microsoft.com/office/drawing/2010/main" val="0"/>
+                <a14:useLocalDpi xmlns:a14="http://schemas.microsoft.com/office/drawing/2010/main" xmlns="" val="0"/>
               </a:ext>
             </a:extLst>
           </a:blip>
@@ -3751,7 +3859,7 @@
     </p:spTree>
     <p:extLst>
       <p:ext uri="{BB962C8B-B14F-4D97-AF65-F5344CB8AC3E}">
-        <p14:creationId xmlns:p14="http://schemas.microsoft.com/office/powerpoint/2010/main" val="468329777"/>
+        <p14:creationId xmlns:p14="http://schemas.microsoft.com/office/powerpoint/2010/main" xmlns="" val="468329777"/>
       </p:ext>
     </p:extLst>
   </p:cSld>
@@ -4161,7 +4269,7 @@
     </p:spTree>
     <p:extLst>
       <p:ext uri="{BB962C8B-B14F-4D97-AF65-F5344CB8AC3E}">
-        <p14:creationId xmlns:p14="http://schemas.microsoft.com/office/powerpoint/2010/main" val="1354103417"/>
+        <p14:creationId xmlns:p14="http://schemas.microsoft.com/office/powerpoint/2010/main" xmlns="" val="1354103417"/>
       </p:ext>
     </p:extLst>
   </p:cSld>
@@ -4254,7 +4362,8 @@
           <a:p>
             <a:fld id="{90F0A293-143E-49F8-AB74-8BE42FB9E430}" type="datetime1">
               <a:rPr lang="pl-PL" smtClean="0"/>
-              <a:t>17.05.2017</a:t>
+              <a:pPr/>
+              <a:t>20.05.2017</a:t>
             </a:fld>
             <a:endParaRPr lang="pl-PL"/>
           </a:p>
@@ -4300,6 +4409,7 @@
           <a:p>
             <a:fld id="{7ABA60A5-3177-43D4-9934-32BA489A924D}" type="slidenum">
               <a:rPr lang="pl-PL" smtClean="0"/>
+              <a:pPr/>
               <a:t>2</a:t>
             </a:fld>
             <a:endParaRPr lang="pl-PL"/>
@@ -4309,7 +4419,7 @@
     </p:spTree>
     <p:extLst>
       <p:ext uri="{BB962C8B-B14F-4D97-AF65-F5344CB8AC3E}">
-        <p14:creationId xmlns:p14="http://schemas.microsoft.com/office/powerpoint/2010/main" val="1679218770"/>
+        <p14:creationId xmlns:p14="http://schemas.microsoft.com/office/powerpoint/2010/main" xmlns="" val="1679218770"/>
       </p:ext>
     </p:extLst>
   </p:cSld>
@@ -4360,7 +4470,7 @@
           <a:p>
             <a:r>
               <a:rPr lang="pl-PL" dirty="0" err="1" smtClean="0"/>
-              <a:t>Backlog</a:t>
+              <a:t>Newsletter</a:t>
             </a:r>
             <a:endParaRPr lang="pl-PL" dirty="0"/>
           </a:p>
@@ -4383,7 +4493,8 @@
           <a:p>
             <a:fld id="{DEBB8349-9EFE-4CF4-A443-9D73D6C5CDDC}" type="datetime1">
               <a:rPr lang="pl-PL" smtClean="0"/>
-              <a:t>17.05.2017</a:t>
+              <a:pPr/>
+              <a:t>20.05.2017</a:t>
             </a:fld>
             <a:endParaRPr lang="pl-PL"/>
           </a:p>
@@ -4429,6 +4540,7 @@
           <a:p>
             <a:fld id="{7ABA60A5-3177-43D4-9934-32BA489A924D}" type="slidenum">
               <a:rPr lang="pl-PL" smtClean="0"/>
+              <a:pPr/>
               <a:t>3</a:t>
             </a:fld>
             <a:endParaRPr lang="pl-PL"/>
@@ -4447,7 +4559,7 @@
           <a:blip r:embed="rId2">
             <a:extLst>
               <a:ext uri="{28A0092B-C50C-407E-A947-70E740481C1C}">
-                <a14:useLocalDpi xmlns:a14="http://schemas.microsoft.com/office/drawing/2010/main" val="0"/>
+                <a14:useLocalDpi xmlns:a14="http://schemas.microsoft.com/office/drawing/2010/main" xmlns="" val="0"/>
               </a:ext>
             </a:extLst>
           </a:blip>
@@ -4471,14 +4583,14 @@
           <a:effectLst/>
           <a:extLst>
             <a:ext uri="{909E8E84-426E-40DD-AFC4-6F175D3DCCD1}">
-              <a14:hiddenFill xmlns:a14="http://schemas.microsoft.com/office/drawing/2010/main">
+              <a14:hiddenFill xmlns:a14="http://schemas.microsoft.com/office/drawing/2010/main" xmlns="">
                 <a:solidFill>
                   <a:schemeClr val="accent1"/>
                 </a:solidFill>
               </a14:hiddenFill>
             </a:ext>
             <a:ext uri="{91240B29-F687-4F45-9708-019B960494DF}">
-              <a14:hiddenLine xmlns:a14="http://schemas.microsoft.com/office/drawing/2010/main" w="9525">
+              <a14:hiddenLine xmlns:a14="http://schemas.microsoft.com/office/drawing/2010/main" xmlns="" w="9525">
                 <a:solidFill>
                   <a:schemeClr val="tx1"/>
                 </a:solidFill>
@@ -4488,7 +4600,7 @@
               </a14:hiddenLine>
             </a:ext>
             <a:ext uri="{AF507438-7753-43E0-B8FC-AC1667EBCBE1}">
-              <a14:hiddenEffects xmlns:a14="http://schemas.microsoft.com/office/drawing/2010/main">
+              <a14:hiddenEffects xmlns:a14="http://schemas.microsoft.com/office/drawing/2010/main" xmlns="">
                 <a:effectLst>
                   <a:outerShdw dist="35921" dir="2700000" algn="ctr" rotWithShape="0">
                     <a:schemeClr val="bg2"/>
@@ -4502,7 +4614,7 @@
     </p:spTree>
     <p:extLst>
       <p:ext uri="{BB962C8B-B14F-4D97-AF65-F5344CB8AC3E}">
-        <p14:creationId xmlns:p14="http://schemas.microsoft.com/office/powerpoint/2010/main" val="982657965"/>
+        <p14:creationId xmlns:p14="http://schemas.microsoft.com/office/powerpoint/2010/main" xmlns="" val="982657965"/>
       </p:ext>
     </p:extLst>
   </p:cSld>
@@ -4576,7 +4688,8 @@
           <a:p>
             <a:fld id="{DEBB8349-9EFE-4CF4-A443-9D73D6C5CDDC}" type="datetime1">
               <a:rPr lang="pl-PL" smtClean="0"/>
-              <a:t>17.05.2017</a:t>
+              <a:pPr/>
+              <a:t>20.05.2017</a:t>
             </a:fld>
             <a:endParaRPr lang="pl-PL"/>
           </a:p>
@@ -4622,6 +4735,7 @@
           <a:p>
             <a:fld id="{7ABA60A5-3177-43D4-9934-32BA489A924D}" type="slidenum">
               <a:rPr lang="pl-PL" smtClean="0"/>
+              <a:pPr/>
               <a:t>4</a:t>
             </a:fld>
             <a:endParaRPr lang="pl-PL"/>
@@ -4640,7 +4754,7 @@
           <a:blip r:embed="rId2">
             <a:extLst>
               <a:ext uri="{28A0092B-C50C-407E-A947-70E740481C1C}">
-                <a14:useLocalDpi xmlns:a14="http://schemas.microsoft.com/office/drawing/2010/main" val="0"/>
+                <a14:useLocalDpi xmlns:a14="http://schemas.microsoft.com/office/drawing/2010/main" xmlns="" val="0"/>
               </a:ext>
             </a:extLst>
           </a:blip>
@@ -4664,14 +4778,14 @@
           <a:effectLst/>
           <a:extLst>
             <a:ext uri="{909E8E84-426E-40DD-AFC4-6F175D3DCCD1}">
-              <a14:hiddenFill xmlns:a14="http://schemas.microsoft.com/office/drawing/2010/main">
+              <a14:hiddenFill xmlns:a14="http://schemas.microsoft.com/office/drawing/2010/main" xmlns="">
                 <a:solidFill>
                   <a:schemeClr val="accent1"/>
                 </a:solidFill>
               </a14:hiddenFill>
             </a:ext>
             <a:ext uri="{91240B29-F687-4F45-9708-019B960494DF}">
-              <a14:hiddenLine xmlns:a14="http://schemas.microsoft.com/office/drawing/2010/main" w="9525">
+              <a14:hiddenLine xmlns:a14="http://schemas.microsoft.com/office/drawing/2010/main" xmlns="" w="9525">
                 <a:solidFill>
                   <a:schemeClr val="tx1"/>
                 </a:solidFill>
@@ -4681,7 +4795,7 @@
               </a14:hiddenLine>
             </a:ext>
             <a:ext uri="{AF507438-7753-43E0-B8FC-AC1667EBCBE1}">
-              <a14:hiddenEffects xmlns:a14="http://schemas.microsoft.com/office/drawing/2010/main">
+              <a14:hiddenEffects xmlns:a14="http://schemas.microsoft.com/office/drawing/2010/main" xmlns="">
                 <a:effectLst>
                   <a:outerShdw dist="35921" dir="2700000" algn="ctr" rotWithShape="0">
                     <a:schemeClr val="bg2"/>
@@ -4695,7 +4809,7 @@
     </p:spTree>
     <p:extLst>
       <p:ext uri="{BB962C8B-B14F-4D97-AF65-F5344CB8AC3E}">
-        <p14:creationId xmlns:p14="http://schemas.microsoft.com/office/powerpoint/2010/main" val="2774064168"/>
+        <p14:creationId xmlns:p14="http://schemas.microsoft.com/office/powerpoint/2010/main" xmlns="" val="2774064168"/>
       </p:ext>
     </p:extLst>
   </p:cSld>
@@ -4769,7 +4883,8 @@
           <a:p>
             <a:fld id="{DEBB8349-9EFE-4CF4-A443-9D73D6C5CDDC}" type="datetime1">
               <a:rPr lang="pl-PL" smtClean="0"/>
-              <a:t>17.05.2017</a:t>
+              <a:pPr/>
+              <a:t>20.05.2017</a:t>
             </a:fld>
             <a:endParaRPr lang="pl-PL"/>
           </a:p>
@@ -4815,6 +4930,7 @@
           <a:p>
             <a:fld id="{7ABA60A5-3177-43D4-9934-32BA489A924D}" type="slidenum">
               <a:rPr lang="pl-PL" smtClean="0"/>
+              <a:pPr/>
               <a:t>5</a:t>
             </a:fld>
             <a:endParaRPr lang="pl-PL"/>
@@ -4833,7 +4949,7 @@
           <a:blip r:embed="rId2">
             <a:extLst>
               <a:ext uri="{28A0092B-C50C-407E-A947-70E740481C1C}">
-                <a14:useLocalDpi xmlns:a14="http://schemas.microsoft.com/office/drawing/2010/main" val="0"/>
+                <a14:useLocalDpi xmlns:a14="http://schemas.microsoft.com/office/drawing/2010/main" xmlns="" val="0"/>
               </a:ext>
             </a:extLst>
           </a:blip>
@@ -4857,14 +4973,14 @@
           <a:effectLst/>
           <a:extLst>
             <a:ext uri="{909E8E84-426E-40DD-AFC4-6F175D3DCCD1}">
-              <a14:hiddenFill xmlns:a14="http://schemas.microsoft.com/office/drawing/2010/main">
+              <a14:hiddenFill xmlns:a14="http://schemas.microsoft.com/office/drawing/2010/main" xmlns="">
                 <a:solidFill>
                   <a:schemeClr val="accent1"/>
                 </a:solidFill>
               </a14:hiddenFill>
             </a:ext>
             <a:ext uri="{91240B29-F687-4F45-9708-019B960494DF}">
-              <a14:hiddenLine xmlns:a14="http://schemas.microsoft.com/office/drawing/2010/main" w="9525">
+              <a14:hiddenLine xmlns:a14="http://schemas.microsoft.com/office/drawing/2010/main" xmlns="" w="9525">
                 <a:solidFill>
                   <a:schemeClr val="tx1"/>
                 </a:solidFill>
@@ -4874,7 +4990,7 @@
               </a14:hiddenLine>
             </a:ext>
             <a:ext uri="{AF507438-7753-43E0-B8FC-AC1667EBCBE1}">
-              <a14:hiddenEffects xmlns:a14="http://schemas.microsoft.com/office/drawing/2010/main">
+              <a14:hiddenEffects xmlns:a14="http://schemas.microsoft.com/office/drawing/2010/main" xmlns="">
                 <a:effectLst>
                   <a:outerShdw dist="35921" dir="2700000" algn="ctr" rotWithShape="0">
                     <a:schemeClr val="bg2"/>
@@ -4888,7 +5004,7 @@
     </p:spTree>
     <p:extLst>
       <p:ext uri="{BB962C8B-B14F-4D97-AF65-F5344CB8AC3E}">
-        <p14:creationId xmlns:p14="http://schemas.microsoft.com/office/powerpoint/2010/main" val="1524689310"/>
+        <p14:creationId xmlns:p14="http://schemas.microsoft.com/office/powerpoint/2010/main" xmlns="" val="1524689310"/>
       </p:ext>
     </p:extLst>
   </p:cSld>
@@ -4966,7 +5082,8 @@
           <a:p>
             <a:fld id="{DEBB8349-9EFE-4CF4-A443-9D73D6C5CDDC}" type="datetime1">
               <a:rPr lang="pl-PL" smtClean="0"/>
-              <a:t>17.05.2017</a:t>
+              <a:pPr/>
+              <a:t>20.05.2017</a:t>
             </a:fld>
             <a:endParaRPr lang="pl-PL"/>
           </a:p>
@@ -5012,6 +5129,7 @@
           <a:p>
             <a:fld id="{7ABA60A5-3177-43D4-9934-32BA489A924D}" type="slidenum">
               <a:rPr lang="pl-PL" smtClean="0"/>
+              <a:pPr/>
               <a:t>6</a:t>
             </a:fld>
             <a:endParaRPr lang="pl-PL"/>
@@ -5030,7 +5148,7 @@
           <a:blip r:embed="rId2">
             <a:extLst>
               <a:ext uri="{28A0092B-C50C-407E-A947-70E740481C1C}">
-                <a14:useLocalDpi xmlns:a14="http://schemas.microsoft.com/office/drawing/2010/main" val="0"/>
+                <a14:useLocalDpi xmlns:a14="http://schemas.microsoft.com/office/drawing/2010/main" xmlns="" val="0"/>
               </a:ext>
             </a:extLst>
           </a:blip>
@@ -5054,14 +5172,14 @@
           <a:effectLst/>
           <a:extLst>
             <a:ext uri="{909E8E84-426E-40DD-AFC4-6F175D3DCCD1}">
-              <a14:hiddenFill xmlns:a14="http://schemas.microsoft.com/office/drawing/2010/main">
+              <a14:hiddenFill xmlns:a14="http://schemas.microsoft.com/office/drawing/2010/main" xmlns="">
                 <a:solidFill>
                   <a:schemeClr val="accent1"/>
                 </a:solidFill>
               </a14:hiddenFill>
             </a:ext>
             <a:ext uri="{91240B29-F687-4F45-9708-019B960494DF}">
-              <a14:hiddenLine xmlns:a14="http://schemas.microsoft.com/office/drawing/2010/main" w="9525">
+              <a14:hiddenLine xmlns:a14="http://schemas.microsoft.com/office/drawing/2010/main" xmlns="" w="9525">
                 <a:solidFill>
                   <a:schemeClr val="tx1"/>
                 </a:solidFill>
@@ -5071,7 +5189,7 @@
               </a14:hiddenLine>
             </a:ext>
             <a:ext uri="{AF507438-7753-43E0-B8FC-AC1667EBCBE1}">
-              <a14:hiddenEffects xmlns:a14="http://schemas.microsoft.com/office/drawing/2010/main">
+              <a14:hiddenEffects xmlns:a14="http://schemas.microsoft.com/office/drawing/2010/main" xmlns="">
                 <a:effectLst>
                   <a:outerShdw dist="35921" dir="2700000" algn="ctr" rotWithShape="0">
                     <a:schemeClr val="bg2"/>
@@ -5085,7 +5203,7 @@
     </p:spTree>
     <p:extLst>
       <p:ext uri="{BB962C8B-B14F-4D97-AF65-F5344CB8AC3E}">
-        <p14:creationId xmlns:p14="http://schemas.microsoft.com/office/powerpoint/2010/main" val="1948775304"/>
+        <p14:creationId xmlns:p14="http://schemas.microsoft.com/office/powerpoint/2010/main" xmlns="" val="1948775304"/>
       </p:ext>
     </p:extLst>
   </p:cSld>
@@ -5163,7 +5281,8 @@
           <a:p>
             <a:fld id="{DEBB8349-9EFE-4CF4-A443-9D73D6C5CDDC}" type="datetime1">
               <a:rPr lang="pl-PL" smtClean="0"/>
-              <a:t>17.05.2017</a:t>
+              <a:pPr/>
+              <a:t>20.05.2017</a:t>
             </a:fld>
             <a:endParaRPr lang="pl-PL"/>
           </a:p>
@@ -5209,6 +5328,7 @@
           <a:p>
             <a:fld id="{7ABA60A5-3177-43D4-9934-32BA489A924D}" type="slidenum">
               <a:rPr lang="pl-PL" smtClean="0"/>
+              <a:pPr/>
               <a:t>7</a:t>
             </a:fld>
             <a:endParaRPr lang="pl-PL"/>
@@ -5227,7 +5347,7 @@
           <a:blip r:embed="rId2">
             <a:extLst>
               <a:ext uri="{28A0092B-C50C-407E-A947-70E740481C1C}">
-                <a14:useLocalDpi xmlns:a14="http://schemas.microsoft.com/office/drawing/2010/main" val="0"/>
+                <a14:useLocalDpi xmlns:a14="http://schemas.microsoft.com/office/drawing/2010/main" xmlns="" val="0"/>
               </a:ext>
             </a:extLst>
           </a:blip>
@@ -5251,14 +5371,14 @@
           <a:effectLst/>
           <a:extLst>
             <a:ext uri="{909E8E84-426E-40DD-AFC4-6F175D3DCCD1}">
-              <a14:hiddenFill xmlns:a14="http://schemas.microsoft.com/office/drawing/2010/main">
+              <a14:hiddenFill xmlns:a14="http://schemas.microsoft.com/office/drawing/2010/main" xmlns="">
                 <a:solidFill>
                   <a:schemeClr val="accent1"/>
                 </a:solidFill>
               </a14:hiddenFill>
             </a:ext>
             <a:ext uri="{91240B29-F687-4F45-9708-019B960494DF}">
-              <a14:hiddenLine xmlns:a14="http://schemas.microsoft.com/office/drawing/2010/main" w="9525">
+              <a14:hiddenLine xmlns:a14="http://schemas.microsoft.com/office/drawing/2010/main" xmlns="" w="9525">
                 <a:solidFill>
                   <a:schemeClr val="tx1"/>
                 </a:solidFill>
@@ -5268,7 +5388,7 @@
               </a14:hiddenLine>
             </a:ext>
             <a:ext uri="{AF507438-7753-43E0-B8FC-AC1667EBCBE1}">
-              <a14:hiddenEffects xmlns:a14="http://schemas.microsoft.com/office/drawing/2010/main">
+              <a14:hiddenEffects xmlns:a14="http://schemas.microsoft.com/office/drawing/2010/main" xmlns="">
                 <a:effectLst>
                   <a:outerShdw dist="35921" dir="2700000" algn="ctr" rotWithShape="0">
                     <a:schemeClr val="bg2"/>
@@ -5282,7 +5402,7 @@
     </p:spTree>
     <p:extLst>
       <p:ext uri="{BB962C8B-B14F-4D97-AF65-F5344CB8AC3E}">
-        <p14:creationId xmlns:p14="http://schemas.microsoft.com/office/powerpoint/2010/main" val="2501508212"/>
+        <p14:creationId xmlns:p14="http://schemas.microsoft.com/office/powerpoint/2010/main" xmlns="" val="2501508212"/>
       </p:ext>
     </p:extLst>
   </p:cSld>
@@ -5356,7 +5476,8 @@
           <a:p>
             <a:fld id="{DEBB8349-9EFE-4CF4-A443-9D73D6C5CDDC}" type="datetime1">
               <a:rPr lang="pl-PL" smtClean="0"/>
-              <a:t>17.05.2017</a:t>
+              <a:pPr/>
+              <a:t>20.05.2017</a:t>
             </a:fld>
             <a:endParaRPr lang="pl-PL"/>
           </a:p>
@@ -5402,6 +5523,7 @@
           <a:p>
             <a:fld id="{7ABA60A5-3177-43D4-9934-32BA489A924D}" type="slidenum">
               <a:rPr lang="pl-PL" smtClean="0"/>
+              <a:pPr/>
               <a:t>8</a:t>
             </a:fld>
             <a:endParaRPr lang="pl-PL"/>
@@ -5420,7 +5542,7 @@
           <a:blip r:embed="rId2">
             <a:extLst>
               <a:ext uri="{28A0092B-C50C-407E-A947-70E740481C1C}">
-                <a14:useLocalDpi xmlns:a14="http://schemas.microsoft.com/office/drawing/2010/main" val="0"/>
+                <a14:useLocalDpi xmlns:a14="http://schemas.microsoft.com/office/drawing/2010/main" xmlns="" val="0"/>
               </a:ext>
             </a:extLst>
           </a:blip>
@@ -5444,14 +5566,14 @@
           <a:effectLst/>
           <a:extLst>
             <a:ext uri="{909E8E84-426E-40DD-AFC4-6F175D3DCCD1}">
-              <a14:hiddenFill xmlns:a14="http://schemas.microsoft.com/office/drawing/2010/main">
+              <a14:hiddenFill xmlns:a14="http://schemas.microsoft.com/office/drawing/2010/main" xmlns="">
                 <a:solidFill>
                   <a:schemeClr val="accent1"/>
                 </a:solidFill>
               </a14:hiddenFill>
             </a:ext>
             <a:ext uri="{91240B29-F687-4F45-9708-019B960494DF}">
-              <a14:hiddenLine xmlns:a14="http://schemas.microsoft.com/office/drawing/2010/main" w="9525">
+              <a14:hiddenLine xmlns:a14="http://schemas.microsoft.com/office/drawing/2010/main" xmlns="" w="9525">
                 <a:solidFill>
                   <a:schemeClr val="tx1"/>
                 </a:solidFill>
@@ -5461,7 +5583,7 @@
               </a14:hiddenLine>
             </a:ext>
             <a:ext uri="{AF507438-7753-43E0-B8FC-AC1667EBCBE1}">
-              <a14:hiddenEffects xmlns:a14="http://schemas.microsoft.com/office/drawing/2010/main">
+              <a14:hiddenEffects xmlns:a14="http://schemas.microsoft.com/office/drawing/2010/main" xmlns="">
                 <a:effectLst>
                   <a:outerShdw dist="35921" dir="2700000" algn="ctr" rotWithShape="0">
                     <a:schemeClr val="bg2"/>
@@ -5484,7 +5606,7 @@
           <a:blip r:embed="rId3" cstate="print">
             <a:extLst>
               <a:ext uri="{28A0092B-C50C-407E-A947-70E740481C1C}">
-                <a14:useLocalDpi xmlns:a14="http://schemas.microsoft.com/office/drawing/2010/main" val="0"/>
+                <a14:useLocalDpi xmlns:a14="http://schemas.microsoft.com/office/drawing/2010/main" xmlns="" val="0"/>
               </a:ext>
             </a:extLst>
           </a:blip>
@@ -5504,7 +5626,7 @@
           <a:noFill/>
           <a:extLst>
             <a:ext uri="{909E8E84-426E-40DD-AFC4-6F175D3DCCD1}">
-              <a14:hiddenFill xmlns:a14="http://schemas.microsoft.com/office/drawing/2010/main">
+              <a14:hiddenFill xmlns:a14="http://schemas.microsoft.com/office/drawing/2010/main" xmlns="">
                 <a:solidFill>
                   <a:srgbClr val="FFFFFF"/>
                 </a:solidFill>
@@ -5516,7 +5638,7 @@
     </p:spTree>
     <p:extLst>
       <p:ext uri="{BB962C8B-B14F-4D97-AF65-F5344CB8AC3E}">
-        <p14:creationId xmlns:p14="http://schemas.microsoft.com/office/powerpoint/2010/main" val="2505419348"/>
+        <p14:creationId xmlns:p14="http://schemas.microsoft.com/office/powerpoint/2010/main" xmlns="" val="2505419348"/>
       </p:ext>
     </p:extLst>
   </p:cSld>

</xml_diff>